<commit_message>
commit for Dr. Park
</commit_message>
<xml_diff>
--- a/Introduction to C++ Programming Language.pptx
+++ b/Introduction to C++ Programming Language.pptx
@@ -5,7 +5,7 @@
     <p:sldMasterId id="2147483648" r:id="rId1"/>
   </p:sldMasterIdLst>
   <p:notesMasterIdLst>
-    <p:notesMasterId r:id="rId44"/>
+    <p:notesMasterId r:id="rId55"/>
   </p:notesMasterIdLst>
   <p:sldIdLst>
     <p:sldId id="256" r:id="rId2"/>
@@ -47,9 +47,20 @@
     <p:sldId id="291" r:id="rId38"/>
     <p:sldId id="293" r:id="rId39"/>
     <p:sldId id="294" r:id="rId40"/>
-    <p:sldId id="295" r:id="rId41"/>
-    <p:sldId id="296" r:id="rId42"/>
-    <p:sldId id="297" r:id="rId43"/>
+    <p:sldId id="296" r:id="rId41"/>
+    <p:sldId id="297" r:id="rId42"/>
+    <p:sldId id="298" r:id="rId43"/>
+    <p:sldId id="299" r:id="rId44"/>
+    <p:sldId id="300" r:id="rId45"/>
+    <p:sldId id="301" r:id="rId46"/>
+    <p:sldId id="303" r:id="rId47"/>
+    <p:sldId id="304" r:id="rId48"/>
+    <p:sldId id="305" r:id="rId49"/>
+    <p:sldId id="308" r:id="rId50"/>
+    <p:sldId id="306" r:id="rId51"/>
+    <p:sldId id="307" r:id="rId52"/>
+    <p:sldId id="302" r:id="rId53"/>
+    <p:sldId id="295" r:id="rId54"/>
   </p:sldIdLst>
   <p:sldSz cx="9144000" cy="6858000" type="screen4x3"/>
   <p:notesSz cx="6985000" cy="9271000"/>
@@ -234,7 +245,7 @@
             <a:fld id="{52400BAD-CCA2-4B48-AAEA-DCAD4DAE5BB6}" type="datetimeFigureOut">
               <a:rPr lang="en-US" smtClean="0"/>
               <a:pPr/>
-              <a:t>9/22/2012</a:t>
+              <a:t>10/3/2012</a:t>
             </a:fld>
             <a:endParaRPr lang="en-US"/>
           </a:p>
@@ -764,7 +775,7 @@
             <a:fld id="{097EF5C1-AED7-4443-A23F-EB7D9B98122B}" type="datetimeFigureOut">
               <a:rPr lang="en-US" smtClean="0"/>
               <a:pPr/>
-              <a:t>9/22/2012</a:t>
+              <a:t>10/3/2012</a:t>
             </a:fld>
             <a:endParaRPr lang="en-US"/>
           </a:p>
@@ -931,7 +942,7 @@
             <a:fld id="{097EF5C1-AED7-4443-A23F-EB7D9B98122B}" type="datetimeFigureOut">
               <a:rPr lang="en-US" smtClean="0"/>
               <a:pPr/>
-              <a:t>9/22/2012</a:t>
+              <a:t>10/3/2012</a:t>
             </a:fld>
             <a:endParaRPr lang="en-US"/>
           </a:p>
@@ -1108,7 +1119,7 @@
             <a:fld id="{097EF5C1-AED7-4443-A23F-EB7D9B98122B}" type="datetimeFigureOut">
               <a:rPr lang="en-US" smtClean="0"/>
               <a:pPr/>
-              <a:t>9/22/2012</a:t>
+              <a:t>10/3/2012</a:t>
             </a:fld>
             <a:endParaRPr lang="en-US"/>
           </a:p>
@@ -1275,7 +1286,7 @@
             <a:fld id="{097EF5C1-AED7-4443-A23F-EB7D9B98122B}" type="datetimeFigureOut">
               <a:rPr lang="en-US" smtClean="0"/>
               <a:pPr/>
-              <a:t>9/22/2012</a:t>
+              <a:t>10/3/2012</a:t>
             </a:fld>
             <a:endParaRPr lang="en-US"/>
           </a:p>
@@ -1518,7 +1529,7 @@
             <a:fld id="{097EF5C1-AED7-4443-A23F-EB7D9B98122B}" type="datetimeFigureOut">
               <a:rPr lang="en-US" smtClean="0"/>
               <a:pPr/>
-              <a:t>9/22/2012</a:t>
+              <a:t>10/3/2012</a:t>
             </a:fld>
             <a:endParaRPr lang="en-US"/>
           </a:p>
@@ -1803,7 +1814,7 @@
             <a:fld id="{097EF5C1-AED7-4443-A23F-EB7D9B98122B}" type="datetimeFigureOut">
               <a:rPr lang="en-US" smtClean="0"/>
               <a:pPr/>
-              <a:t>9/22/2012</a:t>
+              <a:t>10/3/2012</a:t>
             </a:fld>
             <a:endParaRPr lang="en-US"/>
           </a:p>
@@ -2222,7 +2233,7 @@
             <a:fld id="{097EF5C1-AED7-4443-A23F-EB7D9B98122B}" type="datetimeFigureOut">
               <a:rPr lang="en-US" smtClean="0"/>
               <a:pPr/>
-              <a:t>9/22/2012</a:t>
+              <a:t>10/3/2012</a:t>
             </a:fld>
             <a:endParaRPr lang="en-US"/>
           </a:p>
@@ -2337,7 +2348,7 @@
             <a:fld id="{097EF5C1-AED7-4443-A23F-EB7D9B98122B}" type="datetimeFigureOut">
               <a:rPr lang="en-US" smtClean="0"/>
               <a:pPr/>
-              <a:t>9/22/2012</a:t>
+              <a:t>10/3/2012</a:t>
             </a:fld>
             <a:endParaRPr lang="en-US"/>
           </a:p>
@@ -2429,7 +2440,7 @@
             <a:fld id="{097EF5C1-AED7-4443-A23F-EB7D9B98122B}" type="datetimeFigureOut">
               <a:rPr lang="en-US" smtClean="0"/>
               <a:pPr/>
-              <a:t>9/22/2012</a:t>
+              <a:t>10/3/2012</a:t>
             </a:fld>
             <a:endParaRPr lang="en-US"/>
           </a:p>
@@ -2703,7 +2714,7 @@
             <a:fld id="{097EF5C1-AED7-4443-A23F-EB7D9B98122B}" type="datetimeFigureOut">
               <a:rPr lang="en-US" smtClean="0"/>
               <a:pPr/>
-              <a:t>9/22/2012</a:t>
+              <a:t>10/3/2012</a:t>
             </a:fld>
             <a:endParaRPr lang="en-US"/>
           </a:p>
@@ -2953,7 +2964,7 @@
             <a:fld id="{097EF5C1-AED7-4443-A23F-EB7D9B98122B}" type="datetimeFigureOut">
               <a:rPr lang="en-US" smtClean="0"/>
               <a:pPr/>
-              <a:t>9/22/2012</a:t>
+              <a:t>10/3/2012</a:t>
             </a:fld>
             <a:endParaRPr lang="en-US"/>
           </a:p>
@@ -3163,7 +3174,7 @@
             <a:fld id="{097EF5C1-AED7-4443-A23F-EB7D9B98122B}" type="datetimeFigureOut">
               <a:rPr lang="en-US" smtClean="0"/>
               <a:pPr/>
-              <a:t>9/22/2012</a:t>
+              <a:t>10/3/2012</a:t>
             </a:fld>
             <a:endParaRPr lang="en-US"/>
           </a:p>
@@ -3797,7 +3808,21 @@
               <a:rPr lang="en-US" dirty="0" smtClean="0"/>
               <a:t>Write a program to output ASCII codes 48 to 65 to the console. </a:t>
             </a:r>
-            <a:endParaRPr lang="en-US" dirty="0"/>
+          </a:p>
+          <a:p>
+            <a:r>
+              <a:rPr lang="en-US" dirty="0" smtClean="0">
+                <a:solidFill>
+                  <a:srgbClr val="FF0000"/>
+                </a:solidFill>
+              </a:rPr>
+              <a:t>Exercise 3.1: write a program to capitalize all letters in a input string. If the letter is already capitalized, make no change.</a:t>
+            </a:r>
+            <a:endParaRPr lang="en-US" dirty="0">
+              <a:solidFill>
+                <a:srgbClr val="FF0000"/>
+              </a:solidFill>
+            </a:endParaRPr>
           </a:p>
         </p:txBody>
       </p:sp>
@@ -4125,7 +4150,7 @@
           <a:p>
             <a:r>
               <a:rPr lang="en-US" dirty="0" smtClean="0"/>
-              <a:t>Modify your own program so each line only display 10 characters separated by a tab.</a:t>
+              <a:t>Modify your own program so each line only displays 10 characters separated by a tab.</a:t>
             </a:r>
           </a:p>
           <a:p>
@@ -4277,21 +4302,9 @@
             </a:r>
             <a:r>
               <a:rPr lang="en-US" dirty="0" smtClean="0"/>
-              <a:t>back“, then exit the program. </a:t>
-            </a:r>
-            <a:r>
-              <a:rPr lang="en-US" dirty="0" smtClean="0">
-                <a:solidFill>
-                  <a:srgbClr val="FF0000"/>
-                </a:solidFill>
-              </a:rPr>
-              <a:t>(hint: use default statement)</a:t>
-            </a:r>
-            <a:endParaRPr lang="en-US" dirty="0">
-              <a:solidFill>
-                <a:srgbClr val="FF0000"/>
-              </a:solidFill>
-            </a:endParaRPr>
+              <a:t>back“, then exit the program. (hint: use default statement)</a:t>
+            </a:r>
+            <a:endParaRPr lang="en-US" dirty="0"/>
           </a:p>
         </p:txBody>
       </p:sp>
@@ -4862,38 +4875,35 @@
           <a:p>
             <a:r>
               <a:rPr lang="en-US" dirty="0" smtClean="0"/>
-              <a:t>Open a </a:t>
-            </a:r>
-            <a:r>
-              <a:rPr lang="en-US" dirty="0" err="1" smtClean="0"/>
-              <a:t>cmd</a:t>
-            </a:r>
-            <a:r>
-              <a:rPr lang="en-US" dirty="0" smtClean="0"/>
-              <a:t> window</a:t>
-            </a:r>
-          </a:p>
-          <a:p>
-            <a:r>
-              <a:rPr lang="en-US" dirty="0" smtClean="0"/>
-              <a:t>Type “net use b: </a:t>
+              <a:t>Open a browser</a:t>
+            </a:r>
+          </a:p>
+          <a:p>
+            <a:r>
+              <a:rPr lang="en-US" dirty="0" smtClean="0"/>
+              <a:t>Go to: </a:t>
             </a:r>
             <a:r>
               <a:rPr lang="en-US" dirty="0" smtClean="0">
-                <a:hlinkClick r:id="rId2" action="ppaction://hlinkfile"/>
+                <a:hlinkClick r:id="rId2"/>
               </a:rPr>
-              <a:t>\\barbi\public</a:t>
-            </a:r>
-            <a:r>
-              <a:rPr lang="en-US" dirty="0" smtClean="0"/>
-              <a:t>”</a:t>
-            </a:r>
-          </a:p>
-          <a:p>
-            <a:r>
-              <a:rPr lang="en-US" dirty="0" smtClean="0"/>
-              <a:t>Go to B:\ioi</a:t>
-            </a:r>
+              <a:t>https://www.github.com/cthomasyeh/IOI</a:t>
+            </a:r>
+            <a:endParaRPr lang="en-US" dirty="0" smtClean="0"/>
+          </a:p>
+          <a:p>
+            <a:r>
+              <a:rPr lang="en-US" dirty="0" smtClean="0"/>
+              <a:t>Download Microsoft VC++ </a:t>
+            </a:r>
+            <a:r>
+              <a:rPr lang="en-US" smtClean="0"/>
+              <a:t>2010 Express</a:t>
+            </a:r>
+            <a:endParaRPr lang="en-US" dirty="0" smtClean="0"/>
+          </a:p>
+          <a:p>
+            <a:endParaRPr lang="en-US" dirty="0" smtClean="0"/>
           </a:p>
           <a:p>
             <a:endParaRPr lang="en-US" dirty="0" smtClean="0"/>
@@ -7016,7 +7026,9 @@
         </p:nvSpPr>
         <p:spPr/>
         <p:txBody>
-          <a:bodyPr/>
+          <a:bodyPr>
+            <a:normAutofit lnSpcReduction="10000"/>
+          </a:bodyPr>
           <a:lstStyle/>
           <a:p>
             <a:r>
@@ -7045,7 +7057,134 @@
               <a:rPr lang="en-US" dirty="0" smtClean="0"/>
               <a:t>() to convert string into other data type </a:t>
             </a:r>
-            <a:endParaRPr lang="en-US" dirty="0"/>
+          </a:p>
+          <a:p>
+            <a:r>
+              <a:rPr lang="en-US" dirty="0" smtClean="0">
+                <a:solidFill>
+                  <a:srgbClr val="FF0000"/>
+                </a:solidFill>
+              </a:rPr>
+              <a:t>Modify type of quantity: short </a:t>
+            </a:r>
+            <a:r>
+              <a:rPr lang="en-US" dirty="0" err="1" smtClean="0">
+                <a:solidFill>
+                  <a:srgbClr val="FF0000"/>
+                </a:solidFill>
+              </a:rPr>
+              <a:t>int</a:t>
+            </a:r>
+            <a:r>
+              <a:rPr lang="en-US" dirty="0" smtClean="0">
+                <a:solidFill>
+                  <a:srgbClr val="FF0000"/>
+                </a:solidFill>
+              </a:rPr>
+              <a:t>, short unsigned </a:t>
+            </a:r>
+            <a:r>
+              <a:rPr lang="en-US" dirty="0" err="1" smtClean="0">
+                <a:solidFill>
+                  <a:srgbClr val="FF0000"/>
+                </a:solidFill>
+              </a:rPr>
+              <a:t>int</a:t>
+            </a:r>
+            <a:r>
+              <a:rPr lang="en-US" dirty="0" smtClean="0">
+                <a:solidFill>
+                  <a:srgbClr val="FF0000"/>
+                </a:solidFill>
+              </a:rPr>
+              <a:t>, int. Learn </a:t>
+            </a:r>
+            <a:r>
+              <a:rPr lang="en-US" smtClean="0">
+                <a:solidFill>
+                  <a:srgbClr val="FF0000"/>
+                </a:solidFill>
+              </a:rPr>
+              <a:t>the integer range in your system.</a:t>
+            </a:r>
+            <a:endParaRPr lang="en-US" dirty="0" smtClean="0">
+              <a:solidFill>
+                <a:srgbClr val="FF0000"/>
+              </a:solidFill>
+            </a:endParaRPr>
+          </a:p>
+          <a:p>
+            <a:r>
+              <a:rPr lang="en-US" dirty="0" err="1" smtClean="0">
+                <a:solidFill>
+                  <a:srgbClr val="FF0000"/>
+                </a:solidFill>
+              </a:rPr>
+              <a:t>int</a:t>
+            </a:r>
+            <a:r>
+              <a:rPr lang="en-US" dirty="0" smtClean="0">
+                <a:solidFill>
+                  <a:srgbClr val="FF0000"/>
+                </a:solidFill>
+              </a:rPr>
+              <a:t> + float will be </a:t>
+            </a:r>
+            <a:r>
+              <a:rPr lang="en-US" dirty="0" err="1" smtClean="0">
+                <a:solidFill>
+                  <a:srgbClr val="FF0000"/>
+                </a:solidFill>
+              </a:rPr>
+              <a:t>int</a:t>
+            </a:r>
+            <a:r>
+              <a:rPr lang="en-US" dirty="0" smtClean="0">
+                <a:solidFill>
+                  <a:srgbClr val="FF0000"/>
+                </a:solidFill>
+              </a:rPr>
+              <a:t> or float?</a:t>
+            </a:r>
+          </a:p>
+          <a:p>
+            <a:r>
+              <a:rPr lang="en-US" dirty="0" err="1" smtClean="0">
+                <a:solidFill>
+                  <a:srgbClr val="FF0000"/>
+                </a:solidFill>
+              </a:rPr>
+              <a:t>stringstream</a:t>
+            </a:r>
+            <a:r>
+              <a:rPr lang="en-US" dirty="0" smtClean="0">
+                <a:solidFill>
+                  <a:srgbClr val="FF0000"/>
+                </a:solidFill>
+              </a:rPr>
+              <a:t>(12.99) &gt;&gt; </a:t>
+            </a:r>
+            <a:r>
+              <a:rPr lang="en-US" dirty="0" err="1" smtClean="0">
+                <a:solidFill>
+                  <a:srgbClr val="FF0000"/>
+                </a:solidFill>
+              </a:rPr>
+              <a:t>int</a:t>
+            </a:r>
+            <a:r>
+              <a:rPr lang="en-US" dirty="0" smtClean="0">
+                <a:solidFill>
+                  <a:srgbClr val="FF0000"/>
+                </a:solidFill>
+              </a:rPr>
+              <a:t> x will display?</a:t>
+            </a:r>
+            <a:endParaRPr lang="en-US" dirty="0">
+              <a:solidFill>
+                <a:srgbClr val="FF0000"/>
+              </a:solidFill>
+            </a:endParaRPr>
           </a:p>
         </p:txBody>
       </p:sp>
@@ -9337,12 +9476,14 @@
         </p:nvSpPr>
         <p:spPr/>
         <p:txBody>
-          <a:bodyPr/>
-          <a:lstStyle/>
-          <a:p>
-            <a:r>
-              <a:rPr lang="en-US" dirty="0" smtClean="0"/>
-              <a:t>Exercise 17: Function Calls</a:t>
+          <a:bodyPr>
+            <a:normAutofit fontScale="90000"/>
+          </a:bodyPr>
+          <a:lstStyle/>
+          <a:p>
+            <a:r>
+              <a:rPr lang="en-US" dirty="0" smtClean="0"/>
+              <a:t>Home work assignment for week 9/23</a:t>
             </a:r>
             <a:endParaRPr lang="en-US" dirty="0"/>
           </a:p>
@@ -9360,20 +9501,76 @@
         </p:nvSpPr>
         <p:spPr/>
         <p:txBody>
-          <a:bodyPr/>
-          <a:lstStyle/>
-          <a:p>
-            <a:r>
-              <a:rPr lang="en-US" dirty="0" smtClean="0"/>
-              <a:t>Rewrite homework assignment 2 using a function call: </a:t>
+          <a:bodyPr>
+            <a:normAutofit fontScale="77500" lnSpcReduction="20000"/>
+          </a:bodyPr>
+          <a:lstStyle/>
+          <a:p>
+            <a:r>
+              <a:rPr lang="en-US" dirty="0" smtClean="0"/>
+              <a:t>Assignment 1: The attached homework23-1.cpp contains an array (</a:t>
             </a:r>
             <a:r>
               <a:rPr lang="en-US" dirty="0" err="1" smtClean="0"/>
-              <a:t>ReadLine</a:t>
-            </a:r>
-            <a:r>
-              <a:rPr lang="en-US" dirty="0" smtClean="0"/>
-              <a:t>()</a:t>
+              <a:t>ar</a:t>
+            </a:r>
+            <a:r>
+              <a:rPr lang="en-US" dirty="0" smtClean="0"/>
+              <a:t>[100]) with 100 integers. Write a simple statement to zero out all the even number elements. For example, your solution should change </a:t>
+            </a:r>
+            <a:r>
+              <a:rPr lang="en-US" dirty="0" err="1" smtClean="0"/>
+              <a:t>ar</a:t>
+            </a:r>
+            <a:r>
+              <a:rPr lang="en-US" dirty="0" smtClean="0"/>
+              <a:t>[0], </a:t>
+            </a:r>
+            <a:r>
+              <a:rPr lang="en-US" dirty="0" err="1" smtClean="0"/>
+              <a:t>ar</a:t>
+            </a:r>
+            <a:r>
+              <a:rPr lang="en-US" dirty="0" smtClean="0"/>
+              <a:t>[2], </a:t>
+            </a:r>
+            <a:r>
+              <a:rPr lang="en-US" dirty="0" err="1" smtClean="0"/>
+              <a:t>ar</a:t>
+            </a:r>
+            <a:r>
+              <a:rPr lang="en-US" dirty="0" smtClean="0"/>
+              <a:t>[4]… </a:t>
+            </a:r>
+            <a:r>
+              <a:rPr lang="en-US" dirty="0" err="1" smtClean="0"/>
+              <a:t>ar</a:t>
+            </a:r>
+            <a:r>
+              <a:rPr lang="en-US" dirty="0" smtClean="0"/>
+              <a:t>[98] to 0, and leave </a:t>
+            </a:r>
+            <a:r>
+              <a:rPr lang="en-US" dirty="0" err="1" smtClean="0"/>
+              <a:t>ar</a:t>
+            </a:r>
+            <a:r>
+              <a:rPr lang="en-US" dirty="0" smtClean="0"/>
+              <a:t>[1], </a:t>
+            </a:r>
+            <a:r>
+              <a:rPr lang="en-US" dirty="0" err="1" smtClean="0"/>
+              <a:t>ar</a:t>
+            </a:r>
+            <a:r>
+              <a:rPr lang="en-US" dirty="0" smtClean="0"/>
+              <a:t>[3]… (the odd number element) unchanged. (hints: you need to look into the pattern of even number index. Use either index % 2 operator, or increment the index by two in each iteration)</a:t>
+            </a:r>
+          </a:p>
+          <a:p>
+            <a:r>
+              <a:rPr lang="en-US" dirty="0" smtClean="0"/>
+              <a:t>Assignment 2: Once you complete assignment 1, the array should look like this: 0, 1, 0, 3, 0, 5, 0, …0, 99.  Write a simple statement to remove all the zero value elements. You solution should change the array into: 1, 3, 5, 7, 9, …,99. Please use the attached homework23-2.cpp as the template.</a:t>
             </a:r>
             <a:endParaRPr lang="en-US" dirty="0"/>
           </a:p>
@@ -9388,183 +9585,6 @@
 </file>
 
 <file path=ppt/slides/slide41.xml><?xml version="1.0" encoding="utf-8"?>
-<p:sld xmlns:a="http://schemas.openxmlformats.org/drawingml/2006/main" xmlns:r="http://schemas.openxmlformats.org/officeDocument/2006/relationships" xmlns:p="http://schemas.openxmlformats.org/presentationml/2006/main">
-  <p:cSld>
-    <p:spTree>
-      <p:nvGrpSpPr>
-        <p:cNvPr id="1" name=""/>
-        <p:cNvGrpSpPr/>
-        <p:nvPr/>
-      </p:nvGrpSpPr>
-      <p:grpSpPr>
-        <a:xfrm>
-          <a:off x="0" y="0"/>
-          <a:ext cx="0" cy="0"/>
-          <a:chOff x="0" y="0"/>
-          <a:chExt cx="0" cy="0"/>
-        </a:xfrm>
-      </p:grpSpPr>
-      <p:sp>
-        <p:nvSpPr>
-          <p:cNvPr id="2" name="Title 1"/>
-          <p:cNvSpPr>
-            <a:spLocks noGrp="1"/>
-          </p:cNvSpPr>
-          <p:nvPr>
-            <p:ph type="title"/>
-          </p:nvPr>
-        </p:nvSpPr>
-        <p:spPr/>
-        <p:txBody>
-          <a:bodyPr>
-            <a:normAutofit fontScale="90000"/>
-          </a:bodyPr>
-          <a:lstStyle/>
-          <a:p>
-            <a:r>
-              <a:rPr lang="en-US" dirty="0" smtClean="0"/>
-              <a:t>Home work assignment for week 9/23</a:t>
-            </a:r>
-            <a:endParaRPr lang="en-US" dirty="0"/>
-          </a:p>
-        </p:txBody>
-      </p:sp>
-      <p:sp>
-        <p:nvSpPr>
-          <p:cNvPr id="3" name="Content Placeholder 2"/>
-          <p:cNvSpPr>
-            <a:spLocks noGrp="1"/>
-          </p:cNvSpPr>
-          <p:nvPr>
-            <p:ph idx="1"/>
-          </p:nvPr>
-        </p:nvSpPr>
-        <p:spPr/>
-        <p:txBody>
-          <a:bodyPr>
-            <a:normAutofit fontScale="77500" lnSpcReduction="20000"/>
-          </a:bodyPr>
-          <a:lstStyle/>
-          <a:p>
-            <a:r>
-              <a:rPr lang="en-US" dirty="0" smtClean="0"/>
-              <a:t>Assignment 1: The attached homework23-1.cpp contains an array (</a:t>
-            </a:r>
-            <a:r>
-              <a:rPr lang="en-US" dirty="0" err="1" smtClean="0"/>
-              <a:t>ar</a:t>
-            </a:r>
-            <a:r>
-              <a:rPr lang="en-US" dirty="0" smtClean="0"/>
-              <a:t>[100]) with 100 integers. Write a simple statement to zero out all the even number elements. For example, your solution should change </a:t>
-            </a:r>
-            <a:r>
-              <a:rPr lang="en-US" dirty="0" err="1" smtClean="0"/>
-              <a:t>ar</a:t>
-            </a:r>
-            <a:r>
-              <a:rPr lang="en-US" dirty="0" smtClean="0"/>
-              <a:t>[0], </a:t>
-            </a:r>
-            <a:r>
-              <a:rPr lang="en-US" dirty="0" err="1" smtClean="0"/>
-              <a:t>ar</a:t>
-            </a:r>
-            <a:r>
-              <a:rPr lang="en-US" dirty="0" smtClean="0"/>
-              <a:t>[2], </a:t>
-            </a:r>
-            <a:r>
-              <a:rPr lang="en-US" dirty="0" err="1" smtClean="0"/>
-              <a:t>ar</a:t>
-            </a:r>
-            <a:r>
-              <a:rPr lang="en-US" dirty="0" smtClean="0"/>
-              <a:t>[4]… </a:t>
-            </a:r>
-            <a:r>
-              <a:rPr lang="en-US" dirty="0" err="1" smtClean="0"/>
-              <a:t>ar</a:t>
-            </a:r>
-            <a:r>
-              <a:rPr lang="en-US" dirty="0" smtClean="0"/>
-              <a:t>[98] to 0, and leave </a:t>
-            </a:r>
-            <a:r>
-              <a:rPr lang="en-US" dirty="0" err="1" smtClean="0"/>
-              <a:t>ar</a:t>
-            </a:r>
-            <a:r>
-              <a:rPr lang="en-US" dirty="0" smtClean="0"/>
-              <a:t>[1], </a:t>
-            </a:r>
-            <a:r>
-              <a:rPr lang="en-US" dirty="0" err="1" smtClean="0"/>
-              <a:t>ar</a:t>
-            </a:r>
-            <a:r>
-              <a:rPr lang="en-US" dirty="0" smtClean="0"/>
-              <a:t>[3]… (the odd number element) unchanged. (hints: you need to look into the pattern of even number index. Use either index % 2 operator, or increment the index by two in each iteration)</a:t>
-            </a:r>
-          </a:p>
-          <a:p>
-            <a:r>
-              <a:rPr lang="en-US" dirty="0" smtClean="0"/>
-              <a:t>Assignment 2: Once you complete assignment 1, the array should look like this: 0, 1, </a:t>
-            </a:r>
-            <a:r>
-              <a:rPr lang="en-US" dirty="0" smtClean="0"/>
-              <a:t>0</a:t>
-            </a:r>
-            <a:r>
-              <a:rPr lang="en-US" dirty="0" smtClean="0"/>
-              <a:t>, </a:t>
-            </a:r>
-            <a:r>
-              <a:rPr lang="en-US" dirty="0" smtClean="0"/>
-              <a:t>3</a:t>
-            </a:r>
-            <a:r>
-              <a:rPr lang="en-US" dirty="0" smtClean="0"/>
-              <a:t>, </a:t>
-            </a:r>
-            <a:r>
-              <a:rPr lang="en-US" dirty="0" smtClean="0"/>
-              <a:t>0</a:t>
-            </a:r>
-            <a:r>
-              <a:rPr lang="en-US" dirty="0" smtClean="0"/>
-              <a:t>, </a:t>
-            </a:r>
-            <a:r>
-              <a:rPr lang="en-US" dirty="0" smtClean="0"/>
-              <a:t>5</a:t>
-            </a:r>
-            <a:r>
-              <a:rPr lang="en-US" dirty="0" smtClean="0"/>
-              <a:t>, </a:t>
-            </a:r>
-            <a:r>
-              <a:rPr lang="en-US" dirty="0" smtClean="0"/>
-              <a:t>0</a:t>
-            </a:r>
-            <a:r>
-              <a:rPr lang="en-US" dirty="0" smtClean="0"/>
-              <a:t>, …0, 99.  Write a simple statement to remove all the zero value elements. You solution should change the array into: 1, 3, 5, 7, 9, …,99. Please use the attached homework23-2.cpp as the template.</a:t>
-            </a:r>
-            <a:endParaRPr lang="en-US" dirty="0"/>
-          </a:p>
-        </p:txBody>
-      </p:sp>
-    </p:spTree>
-  </p:cSld>
-  <p:clrMapOvr>
-    <a:masterClrMapping/>
-  </p:clrMapOvr>
-</p:sld>
-</file>
-
-<file path=ppt/slides/slide42.xml><?xml version="1.0" encoding="utf-8"?>
 <p:sld xmlns:a="http://schemas.openxmlformats.org/drawingml/2006/main" xmlns:r="http://schemas.openxmlformats.org/officeDocument/2006/relationships" xmlns:p="http://schemas.openxmlformats.org/presentationml/2006/main">
   <p:cSld>
     <p:spTree>
@@ -10220,6 +10240,1305 @@
 </p:sld>
 </file>
 
+<file path=ppt/slides/slide42.xml><?xml version="1.0" encoding="utf-8"?>
+<p:sld xmlns:a="http://schemas.openxmlformats.org/drawingml/2006/main" xmlns:r="http://schemas.openxmlformats.org/officeDocument/2006/relationships" xmlns:p="http://schemas.openxmlformats.org/presentationml/2006/main">
+  <p:cSld>
+    <p:spTree>
+      <p:nvGrpSpPr>
+        <p:cNvPr id="1" name=""/>
+        <p:cNvGrpSpPr/>
+        <p:nvPr/>
+      </p:nvGrpSpPr>
+      <p:grpSpPr>
+        <a:xfrm>
+          <a:off x="0" y="0"/>
+          <a:ext cx="0" cy="0"/>
+          <a:chOff x="0" y="0"/>
+          <a:chExt cx="0" cy="0"/>
+        </a:xfrm>
+      </p:grpSpPr>
+      <p:sp>
+        <p:nvSpPr>
+          <p:cNvPr id="2" name="Title 1"/>
+          <p:cNvSpPr>
+            <a:spLocks noGrp="1"/>
+          </p:cNvSpPr>
+          <p:nvPr>
+            <p:ph type="title"/>
+          </p:nvPr>
+        </p:nvSpPr>
+        <p:spPr/>
+        <p:txBody>
+          <a:bodyPr/>
+          <a:lstStyle/>
+          <a:p>
+            <a:r>
+              <a:rPr lang="en-US" dirty="0" smtClean="0"/>
+              <a:t>Pointers</a:t>
+            </a:r>
+            <a:endParaRPr lang="en-US" dirty="0"/>
+          </a:p>
+        </p:txBody>
+      </p:sp>
+      <p:sp>
+        <p:nvSpPr>
+          <p:cNvPr id="3" name="Content Placeholder 2"/>
+          <p:cNvSpPr>
+            <a:spLocks noGrp="1"/>
+          </p:cNvSpPr>
+          <p:nvPr>
+            <p:ph idx="1"/>
+          </p:nvPr>
+        </p:nvSpPr>
+        <p:spPr>
+          <a:xfrm>
+            <a:off x="457200" y="1600200"/>
+            <a:ext cx="4191000" cy="4953000"/>
+          </a:xfrm>
+        </p:spPr>
+        <p:txBody>
+          <a:bodyPr/>
+          <a:lstStyle/>
+          <a:p>
+            <a:r>
+              <a:rPr lang="en-US" dirty="0" smtClean="0"/>
+              <a:t>Pointer is the address of a variable, array, or function</a:t>
+            </a:r>
+          </a:p>
+          <a:p>
+            <a:r>
+              <a:rPr lang="en-US" dirty="0" smtClean="0"/>
+              <a:t>‘a’ is a label pointing to a memory address, containing integer value of 3</a:t>
+            </a:r>
+          </a:p>
+          <a:p>
+            <a:r>
+              <a:rPr lang="en-US" dirty="0" smtClean="0"/>
+              <a:t>‘</a:t>
+            </a:r>
+            <a:r>
+              <a:rPr lang="en-US" dirty="0" err="1" smtClean="0"/>
+              <a:t>ap</a:t>
+            </a:r>
+            <a:r>
+              <a:rPr lang="en-US" dirty="0" smtClean="0"/>
+              <a:t>’ is the address </a:t>
+            </a:r>
+            <a:endParaRPr lang="en-US" dirty="0"/>
+          </a:p>
+        </p:txBody>
+      </p:sp>
+      <p:sp>
+        <p:nvSpPr>
+          <p:cNvPr id="4" name="Rectangle 3"/>
+          <p:cNvSpPr/>
+          <p:nvPr/>
+        </p:nvSpPr>
+        <p:spPr>
+          <a:xfrm>
+            <a:off x="7315200" y="1828800"/>
+            <a:ext cx="533400" cy="3962400"/>
+          </a:xfrm>
+          <a:prstGeom prst="rect">
+            <a:avLst/>
+          </a:prstGeom>
+        </p:spPr>
+        <p:style>
+          <a:lnRef idx="2">
+            <a:schemeClr val="accent1">
+              <a:shade val="50000"/>
+            </a:schemeClr>
+          </a:lnRef>
+          <a:fillRef idx="1">
+            <a:schemeClr val="accent1"/>
+          </a:fillRef>
+          <a:effectRef idx="0">
+            <a:schemeClr val="accent1"/>
+          </a:effectRef>
+          <a:fontRef idx="minor">
+            <a:schemeClr val="lt1"/>
+          </a:fontRef>
+        </p:style>
+        <p:txBody>
+          <a:bodyPr rtlCol="0" anchor="ctr"/>
+          <a:lstStyle/>
+          <a:p>
+            <a:pPr algn="ctr"/>
+            <a:endParaRPr lang="en-US"/>
+          </a:p>
+        </p:txBody>
+      </p:sp>
+      <p:cxnSp>
+        <p:nvCxnSpPr>
+          <p:cNvPr id="6" name="Straight Connector 5"/>
+          <p:cNvCxnSpPr/>
+          <p:nvPr/>
+        </p:nvCxnSpPr>
+        <p:spPr>
+          <a:xfrm>
+            <a:off x="7315200" y="2209800"/>
+            <a:ext cx="533400" cy="0"/>
+          </a:xfrm>
+          <a:prstGeom prst="line">
+            <a:avLst/>
+          </a:prstGeom>
+          <a:ln w="19050">
+            <a:solidFill>
+              <a:schemeClr val="tx1"/>
+            </a:solidFill>
+          </a:ln>
+        </p:spPr>
+        <p:style>
+          <a:lnRef idx="1">
+            <a:schemeClr val="accent1"/>
+          </a:lnRef>
+          <a:fillRef idx="0">
+            <a:schemeClr val="accent1"/>
+          </a:fillRef>
+          <a:effectRef idx="0">
+            <a:schemeClr val="accent1"/>
+          </a:effectRef>
+          <a:fontRef idx="minor">
+            <a:schemeClr val="tx1"/>
+          </a:fontRef>
+        </p:style>
+      </p:cxnSp>
+      <p:cxnSp>
+        <p:nvCxnSpPr>
+          <p:cNvPr id="7" name="Straight Connector 6"/>
+          <p:cNvCxnSpPr/>
+          <p:nvPr/>
+        </p:nvCxnSpPr>
+        <p:spPr>
+          <a:xfrm>
+            <a:off x="7315200" y="2590800"/>
+            <a:ext cx="533400" cy="0"/>
+          </a:xfrm>
+          <a:prstGeom prst="line">
+            <a:avLst/>
+          </a:prstGeom>
+          <a:ln w="19050">
+            <a:solidFill>
+              <a:schemeClr val="tx1"/>
+            </a:solidFill>
+          </a:ln>
+        </p:spPr>
+        <p:style>
+          <a:lnRef idx="1">
+            <a:schemeClr val="accent1"/>
+          </a:lnRef>
+          <a:fillRef idx="0">
+            <a:schemeClr val="accent1"/>
+          </a:fillRef>
+          <a:effectRef idx="0">
+            <a:schemeClr val="accent1"/>
+          </a:effectRef>
+          <a:fontRef idx="minor">
+            <a:schemeClr val="tx1"/>
+          </a:fontRef>
+        </p:style>
+      </p:cxnSp>
+      <p:cxnSp>
+        <p:nvCxnSpPr>
+          <p:cNvPr id="8" name="Straight Connector 7"/>
+          <p:cNvCxnSpPr/>
+          <p:nvPr/>
+        </p:nvCxnSpPr>
+        <p:spPr>
+          <a:xfrm>
+            <a:off x="7315200" y="2971800"/>
+            <a:ext cx="533400" cy="0"/>
+          </a:xfrm>
+          <a:prstGeom prst="line">
+            <a:avLst/>
+          </a:prstGeom>
+          <a:ln w="19050">
+            <a:solidFill>
+              <a:schemeClr val="tx1"/>
+            </a:solidFill>
+          </a:ln>
+        </p:spPr>
+        <p:style>
+          <a:lnRef idx="1">
+            <a:schemeClr val="accent1"/>
+          </a:lnRef>
+          <a:fillRef idx="0">
+            <a:schemeClr val="accent1"/>
+          </a:fillRef>
+          <a:effectRef idx="0">
+            <a:schemeClr val="accent1"/>
+          </a:effectRef>
+          <a:fontRef idx="minor">
+            <a:schemeClr val="tx1"/>
+          </a:fontRef>
+        </p:style>
+      </p:cxnSp>
+      <p:cxnSp>
+        <p:nvCxnSpPr>
+          <p:cNvPr id="9" name="Straight Connector 8"/>
+          <p:cNvCxnSpPr/>
+          <p:nvPr/>
+        </p:nvCxnSpPr>
+        <p:spPr>
+          <a:xfrm>
+            <a:off x="7315200" y="3352800"/>
+            <a:ext cx="533400" cy="0"/>
+          </a:xfrm>
+          <a:prstGeom prst="line">
+            <a:avLst/>
+          </a:prstGeom>
+          <a:ln w="19050">
+            <a:solidFill>
+              <a:schemeClr val="tx1"/>
+            </a:solidFill>
+          </a:ln>
+        </p:spPr>
+        <p:style>
+          <a:lnRef idx="1">
+            <a:schemeClr val="accent1"/>
+          </a:lnRef>
+          <a:fillRef idx="0">
+            <a:schemeClr val="accent1"/>
+          </a:fillRef>
+          <a:effectRef idx="0">
+            <a:schemeClr val="accent1"/>
+          </a:effectRef>
+          <a:fontRef idx="minor">
+            <a:schemeClr val="tx1"/>
+          </a:fontRef>
+        </p:style>
+      </p:cxnSp>
+      <p:cxnSp>
+        <p:nvCxnSpPr>
+          <p:cNvPr id="10" name="Straight Connector 9"/>
+          <p:cNvCxnSpPr/>
+          <p:nvPr/>
+        </p:nvCxnSpPr>
+        <p:spPr>
+          <a:xfrm>
+            <a:off x="7315200" y="3733800"/>
+            <a:ext cx="533400" cy="0"/>
+          </a:xfrm>
+          <a:prstGeom prst="line">
+            <a:avLst/>
+          </a:prstGeom>
+          <a:ln w="19050">
+            <a:solidFill>
+              <a:schemeClr val="tx1"/>
+            </a:solidFill>
+          </a:ln>
+        </p:spPr>
+        <p:style>
+          <a:lnRef idx="1">
+            <a:schemeClr val="accent1"/>
+          </a:lnRef>
+          <a:fillRef idx="0">
+            <a:schemeClr val="accent1"/>
+          </a:fillRef>
+          <a:effectRef idx="0">
+            <a:schemeClr val="accent1"/>
+          </a:effectRef>
+          <a:fontRef idx="minor">
+            <a:schemeClr val="tx1"/>
+          </a:fontRef>
+        </p:style>
+      </p:cxnSp>
+      <p:sp>
+        <p:nvSpPr>
+          <p:cNvPr id="11" name="TextBox 10"/>
+          <p:cNvSpPr txBox="1"/>
+          <p:nvPr/>
+        </p:nvSpPr>
+        <p:spPr>
+          <a:xfrm>
+            <a:off x="5410200" y="2057400"/>
+            <a:ext cx="1083951" cy="1754326"/>
+          </a:xfrm>
+          <a:prstGeom prst="rect">
+            <a:avLst/>
+          </a:prstGeom>
+          <a:noFill/>
+        </p:spPr>
+        <p:txBody>
+          <a:bodyPr wrap="none" rtlCol="0">
+            <a:spAutoFit/>
+          </a:bodyPr>
+          <a:lstStyle/>
+          <a:p>
+            <a:r>
+              <a:rPr lang="en-US" dirty="0" err="1" smtClean="0"/>
+              <a:t>i</a:t>
+            </a:r>
+            <a:r>
+              <a:rPr lang="en-US" dirty="0" err="1" smtClean="0"/>
+              <a:t>nt</a:t>
+            </a:r>
+            <a:r>
+              <a:rPr lang="en-US" dirty="0" smtClean="0"/>
+              <a:t> a=3;</a:t>
+            </a:r>
+          </a:p>
+          <a:p>
+            <a:r>
+              <a:rPr lang="en-US" dirty="0" err="1" smtClean="0"/>
+              <a:t>i</a:t>
+            </a:r>
+            <a:r>
+              <a:rPr lang="en-US" dirty="0" err="1" smtClean="0"/>
+              <a:t>nt</a:t>
+            </a:r>
+            <a:r>
+              <a:rPr lang="en-US" dirty="0" smtClean="0"/>
+              <a:t> *</a:t>
+            </a:r>
+            <a:r>
+              <a:rPr lang="en-US" dirty="0" err="1" smtClean="0"/>
+              <a:t>ap</a:t>
+            </a:r>
+            <a:r>
+              <a:rPr lang="en-US" dirty="0" smtClean="0"/>
+              <a:t>;</a:t>
+            </a:r>
+          </a:p>
+          <a:p>
+            <a:endParaRPr lang="en-US" dirty="0" smtClean="0"/>
+          </a:p>
+          <a:p>
+            <a:r>
+              <a:rPr lang="en-US" dirty="0" smtClean="0"/>
+              <a:t>*</a:t>
+            </a:r>
+            <a:r>
+              <a:rPr lang="en-US" dirty="0" err="1" smtClean="0"/>
+              <a:t>ap</a:t>
+            </a:r>
+            <a:r>
+              <a:rPr lang="en-US" dirty="0" smtClean="0"/>
+              <a:t> = &amp;a;</a:t>
+            </a:r>
+          </a:p>
+          <a:p>
+            <a:endParaRPr lang="en-US" dirty="0" smtClean="0"/>
+          </a:p>
+          <a:p>
+            <a:endParaRPr lang="en-US" dirty="0"/>
+          </a:p>
+        </p:txBody>
+      </p:sp>
+      <p:sp>
+        <p:nvSpPr>
+          <p:cNvPr id="12" name="TextBox 11"/>
+          <p:cNvSpPr txBox="1"/>
+          <p:nvPr/>
+        </p:nvSpPr>
+        <p:spPr>
+          <a:xfrm>
+            <a:off x="7467600" y="2590800"/>
+            <a:ext cx="301686" cy="369332"/>
+          </a:xfrm>
+          <a:prstGeom prst="rect">
+            <a:avLst/>
+          </a:prstGeom>
+          <a:noFill/>
+        </p:spPr>
+        <p:txBody>
+          <a:bodyPr wrap="none" rtlCol="0">
+            <a:spAutoFit/>
+          </a:bodyPr>
+          <a:lstStyle/>
+          <a:p>
+            <a:r>
+              <a:rPr lang="en-US" dirty="0" smtClean="0"/>
+              <a:t>3</a:t>
+            </a:r>
+            <a:endParaRPr lang="en-US" dirty="0"/>
+          </a:p>
+        </p:txBody>
+      </p:sp>
+      <p:sp>
+        <p:nvSpPr>
+          <p:cNvPr id="13" name="TextBox 12"/>
+          <p:cNvSpPr txBox="1"/>
+          <p:nvPr/>
+        </p:nvSpPr>
+        <p:spPr>
+          <a:xfrm>
+            <a:off x="7010400" y="2590800"/>
+            <a:ext cx="295274" cy="369332"/>
+          </a:xfrm>
+          <a:prstGeom prst="rect">
+            <a:avLst/>
+          </a:prstGeom>
+          <a:noFill/>
+        </p:spPr>
+        <p:txBody>
+          <a:bodyPr wrap="none" rtlCol="0">
+            <a:spAutoFit/>
+          </a:bodyPr>
+          <a:lstStyle/>
+          <a:p>
+            <a:r>
+              <a:rPr lang="en-US" dirty="0" smtClean="0"/>
+              <a:t>a</a:t>
+            </a:r>
+            <a:endParaRPr lang="en-US" dirty="0"/>
+          </a:p>
+        </p:txBody>
+      </p:sp>
+    </p:spTree>
+  </p:cSld>
+  <p:clrMapOvr>
+    <a:masterClrMapping/>
+  </p:clrMapOvr>
+</p:sld>
+</file>
+
+<file path=ppt/slides/slide43.xml><?xml version="1.0" encoding="utf-8"?>
+<p:sld xmlns:a="http://schemas.openxmlformats.org/drawingml/2006/main" xmlns:r="http://schemas.openxmlformats.org/officeDocument/2006/relationships" xmlns:p="http://schemas.openxmlformats.org/presentationml/2006/main">
+  <p:cSld>
+    <p:spTree>
+      <p:nvGrpSpPr>
+        <p:cNvPr id="1" name=""/>
+        <p:cNvGrpSpPr/>
+        <p:nvPr/>
+      </p:nvGrpSpPr>
+      <p:grpSpPr>
+        <a:xfrm>
+          <a:off x="0" y="0"/>
+          <a:ext cx="0" cy="0"/>
+          <a:chOff x="0" y="0"/>
+          <a:chExt cx="0" cy="0"/>
+        </a:xfrm>
+      </p:grpSpPr>
+      <p:sp>
+        <p:nvSpPr>
+          <p:cNvPr id="2" name="Title 1"/>
+          <p:cNvSpPr>
+            <a:spLocks noGrp="1"/>
+          </p:cNvSpPr>
+          <p:nvPr>
+            <p:ph type="title"/>
+          </p:nvPr>
+        </p:nvSpPr>
+        <p:spPr/>
+        <p:txBody>
+          <a:bodyPr/>
+          <a:lstStyle/>
+          <a:p>
+            <a:r>
+              <a:rPr lang="en-US" dirty="0" smtClean="0"/>
+              <a:t>Example</a:t>
+            </a:r>
+            <a:endParaRPr lang="en-US" dirty="0"/>
+          </a:p>
+        </p:txBody>
+      </p:sp>
+      <p:sp>
+        <p:nvSpPr>
+          <p:cNvPr id="3" name="Content Placeholder 2"/>
+          <p:cNvSpPr>
+            <a:spLocks noGrp="1"/>
+          </p:cNvSpPr>
+          <p:nvPr>
+            <p:ph idx="1"/>
+          </p:nvPr>
+        </p:nvSpPr>
+        <p:spPr>
+          <a:xfrm>
+            <a:off x="1676400" y="2438400"/>
+            <a:ext cx="3352800" cy="2438400"/>
+          </a:xfrm>
+        </p:spPr>
+        <p:txBody>
+          <a:bodyPr/>
+          <a:lstStyle/>
+          <a:p>
+            <a:pPr>
+              <a:buNone/>
+            </a:pPr>
+            <a:r>
+              <a:rPr lang="en-US" dirty="0" err="1" smtClean="0"/>
+              <a:t>int</a:t>
+            </a:r>
+            <a:r>
+              <a:rPr lang="en-US" dirty="0" smtClean="0"/>
+              <a:t> *a;</a:t>
+            </a:r>
+          </a:p>
+          <a:p>
+            <a:pPr>
+              <a:buNone/>
+            </a:pPr>
+            <a:r>
+              <a:rPr lang="en-US" dirty="0" err="1" smtClean="0"/>
+              <a:t>int</a:t>
+            </a:r>
+            <a:r>
+              <a:rPr lang="en-US" dirty="0" smtClean="0"/>
+              <a:t> b;</a:t>
+            </a:r>
+          </a:p>
+          <a:p>
+            <a:pPr>
+              <a:buNone/>
+            </a:pPr>
+            <a:r>
+              <a:rPr lang="en-US" dirty="0" smtClean="0"/>
+              <a:t>a = &amp;b;</a:t>
+            </a:r>
+            <a:endParaRPr lang="en-US" dirty="0"/>
+          </a:p>
+        </p:txBody>
+      </p:sp>
+      <p:pic>
+        <p:nvPicPr>
+          <p:cNvPr id="4" name="Picture 2" descr="http://upload.wikimedia.org/wikipedia/commons/thumb/b/b4/Pointers.svg/220px-Pointers.svg.png"/>
+          <p:cNvPicPr>
+            <a:picLocks noChangeAspect="1" noChangeArrowheads="1"/>
+          </p:cNvPicPr>
+          <p:nvPr/>
+        </p:nvPicPr>
+        <p:blipFill>
+          <a:blip r:embed="rId2" cstate="print"/>
+          <a:srcRect/>
+          <a:stretch>
+            <a:fillRect/>
+          </a:stretch>
+        </p:blipFill>
+        <p:spPr bwMode="auto">
+          <a:xfrm>
+            <a:off x="5486400" y="1447800"/>
+            <a:ext cx="2971800" cy="3295998"/>
+          </a:xfrm>
+          <a:prstGeom prst="rect">
+            <a:avLst/>
+          </a:prstGeom>
+          <a:noFill/>
+        </p:spPr>
+      </p:pic>
+      <p:sp>
+        <p:nvSpPr>
+          <p:cNvPr id="5" name="TextBox 4"/>
+          <p:cNvSpPr txBox="1"/>
+          <p:nvPr/>
+        </p:nvSpPr>
+        <p:spPr>
+          <a:xfrm>
+            <a:off x="6019800" y="5257800"/>
+            <a:ext cx="1765420" cy="369332"/>
+          </a:xfrm>
+          <a:prstGeom prst="rect">
+            <a:avLst/>
+          </a:prstGeom>
+          <a:noFill/>
+        </p:spPr>
+        <p:txBody>
+          <a:bodyPr wrap="none" rtlCol="0">
+            <a:spAutoFit/>
+          </a:bodyPr>
+          <a:lstStyle/>
+          <a:p>
+            <a:r>
+              <a:rPr lang="en-US" dirty="0" smtClean="0"/>
+              <a:t>Credit: </a:t>
+            </a:r>
+            <a:r>
+              <a:rPr lang="en-US" dirty="0" err="1" smtClean="0"/>
+              <a:t>wikipedia</a:t>
+            </a:r>
+            <a:endParaRPr lang="en-US" dirty="0"/>
+          </a:p>
+        </p:txBody>
+      </p:sp>
+    </p:spTree>
+  </p:cSld>
+  <p:clrMapOvr>
+    <a:masterClrMapping/>
+  </p:clrMapOvr>
+</p:sld>
+</file>
+
+<file path=ppt/slides/slide44.xml><?xml version="1.0" encoding="utf-8"?>
+<p:sld xmlns:a="http://schemas.openxmlformats.org/drawingml/2006/main" xmlns:r="http://schemas.openxmlformats.org/officeDocument/2006/relationships" xmlns:p="http://schemas.openxmlformats.org/presentationml/2006/main">
+  <p:cSld>
+    <p:spTree>
+      <p:nvGrpSpPr>
+        <p:cNvPr id="1" name=""/>
+        <p:cNvGrpSpPr/>
+        <p:nvPr/>
+      </p:nvGrpSpPr>
+      <p:grpSpPr>
+        <a:xfrm>
+          <a:off x="0" y="0"/>
+          <a:ext cx="0" cy="0"/>
+          <a:chOff x="0" y="0"/>
+          <a:chExt cx="0" cy="0"/>
+        </a:xfrm>
+      </p:grpSpPr>
+      <p:sp>
+        <p:nvSpPr>
+          <p:cNvPr id="2" name="Title 1"/>
+          <p:cNvSpPr>
+            <a:spLocks noGrp="1"/>
+          </p:cNvSpPr>
+          <p:nvPr>
+            <p:ph type="title"/>
+          </p:nvPr>
+        </p:nvSpPr>
+        <p:spPr/>
+        <p:txBody>
+          <a:bodyPr/>
+          <a:lstStyle/>
+          <a:p>
+            <a:r>
+              <a:rPr lang="en-US" dirty="0" smtClean="0"/>
+              <a:t>Application of pointers</a:t>
+            </a:r>
+            <a:endParaRPr lang="en-US" dirty="0"/>
+          </a:p>
+        </p:txBody>
+      </p:sp>
+      <p:sp>
+        <p:nvSpPr>
+          <p:cNvPr id="3" name="Content Placeholder 2"/>
+          <p:cNvSpPr>
+            <a:spLocks noGrp="1"/>
+          </p:cNvSpPr>
+          <p:nvPr>
+            <p:ph idx="1"/>
+          </p:nvPr>
+        </p:nvSpPr>
+        <p:spPr/>
+        <p:txBody>
+          <a:bodyPr/>
+          <a:lstStyle/>
+          <a:p>
+            <a:r>
+              <a:rPr lang="en-US" dirty="0" smtClean="0"/>
+              <a:t>Pointers are widely used in advanced Data Structures such as Stack, Tree, List, and Graph</a:t>
+            </a:r>
+          </a:p>
+          <a:p>
+            <a:r>
+              <a:rPr lang="en-US" dirty="0" smtClean="0"/>
+              <a:t>Pointers are used to store the relationship among nodes of Data Structures</a:t>
+            </a:r>
+          </a:p>
+          <a:p>
+            <a:endParaRPr lang="en-US" dirty="0"/>
+          </a:p>
+        </p:txBody>
+      </p:sp>
+    </p:spTree>
+  </p:cSld>
+  <p:clrMapOvr>
+    <a:masterClrMapping/>
+  </p:clrMapOvr>
+</p:sld>
+</file>
+
+<file path=ppt/slides/slide45.xml><?xml version="1.0" encoding="utf-8"?>
+<p:sld xmlns:a="http://schemas.openxmlformats.org/drawingml/2006/main" xmlns:r="http://schemas.openxmlformats.org/officeDocument/2006/relationships" xmlns:p="http://schemas.openxmlformats.org/presentationml/2006/main">
+  <p:cSld>
+    <p:spTree>
+      <p:nvGrpSpPr>
+        <p:cNvPr id="1" name=""/>
+        <p:cNvGrpSpPr/>
+        <p:nvPr/>
+      </p:nvGrpSpPr>
+      <p:grpSpPr>
+        <a:xfrm>
+          <a:off x="0" y="0"/>
+          <a:ext cx="0" cy="0"/>
+          <a:chOff x="0" y="0"/>
+          <a:chExt cx="0" cy="0"/>
+        </a:xfrm>
+      </p:grpSpPr>
+      <p:sp>
+        <p:nvSpPr>
+          <p:cNvPr id="2" name="Title 1"/>
+          <p:cNvSpPr>
+            <a:spLocks noGrp="1"/>
+          </p:cNvSpPr>
+          <p:nvPr>
+            <p:ph type="title"/>
+          </p:nvPr>
+        </p:nvSpPr>
+        <p:spPr/>
+        <p:txBody>
+          <a:bodyPr/>
+          <a:lstStyle/>
+          <a:p>
+            <a:r>
+              <a:rPr lang="en-US" dirty="0" smtClean="0"/>
+              <a:t>Exercise 18</a:t>
+            </a:r>
+            <a:endParaRPr lang="en-US" dirty="0"/>
+          </a:p>
+        </p:txBody>
+      </p:sp>
+      <p:sp>
+        <p:nvSpPr>
+          <p:cNvPr id="3" name="Content Placeholder 2"/>
+          <p:cNvSpPr>
+            <a:spLocks noGrp="1"/>
+          </p:cNvSpPr>
+          <p:nvPr>
+            <p:ph idx="1"/>
+          </p:nvPr>
+        </p:nvSpPr>
+        <p:spPr/>
+        <p:txBody>
+          <a:bodyPr/>
+          <a:lstStyle/>
+          <a:p>
+            <a:r>
+              <a:rPr lang="en-US" dirty="0" smtClean="0"/>
+              <a:t>Load exercise18.cpp into solution.</a:t>
+            </a:r>
+          </a:p>
+          <a:p>
+            <a:r>
+              <a:rPr lang="en-US" dirty="0" smtClean="0"/>
+              <a:t>Describe in English why </a:t>
+            </a:r>
+            <a:r>
+              <a:rPr lang="en-US" dirty="0" err="1" smtClean="0"/>
+              <a:t>b</a:t>
+            </a:r>
+            <a:r>
+              <a:rPr lang="en-US" dirty="0" err="1" smtClean="0"/>
+              <a:t>’s</a:t>
+            </a:r>
+            <a:r>
+              <a:rPr lang="en-US" dirty="0" smtClean="0"/>
+              <a:t> value remains unchanged but </a:t>
+            </a:r>
+            <a:r>
+              <a:rPr lang="en-US" dirty="0" smtClean="0"/>
+              <a:t>c</a:t>
+            </a:r>
+            <a:r>
+              <a:rPr lang="en-US" dirty="0" smtClean="0"/>
+              <a:t> does not. Also describe at which point the value of c gets modified.</a:t>
+            </a:r>
+          </a:p>
+          <a:p>
+            <a:pPr>
+              <a:buNone/>
+            </a:pPr>
+            <a:endParaRPr lang="en-US" dirty="0" smtClean="0"/>
+          </a:p>
+          <a:p>
+            <a:endParaRPr lang="en-US" dirty="0"/>
+          </a:p>
+        </p:txBody>
+      </p:sp>
+    </p:spTree>
+  </p:cSld>
+  <p:clrMapOvr>
+    <a:masterClrMapping/>
+  </p:clrMapOvr>
+</p:sld>
+</file>
+
+<file path=ppt/slides/slide46.xml><?xml version="1.0" encoding="utf-8"?>
+<p:sld xmlns:a="http://schemas.openxmlformats.org/drawingml/2006/main" xmlns:r="http://schemas.openxmlformats.org/officeDocument/2006/relationships" xmlns:p="http://schemas.openxmlformats.org/presentationml/2006/main">
+  <p:cSld>
+    <p:spTree>
+      <p:nvGrpSpPr>
+        <p:cNvPr id="1" name=""/>
+        <p:cNvGrpSpPr/>
+        <p:nvPr/>
+      </p:nvGrpSpPr>
+      <p:grpSpPr>
+        <a:xfrm>
+          <a:off x="0" y="0"/>
+          <a:ext cx="0" cy="0"/>
+          <a:chOff x="0" y="0"/>
+          <a:chExt cx="0" cy="0"/>
+        </a:xfrm>
+      </p:grpSpPr>
+      <p:sp>
+        <p:nvSpPr>
+          <p:cNvPr id="2" name="Title 1"/>
+          <p:cNvSpPr>
+            <a:spLocks noGrp="1"/>
+          </p:cNvSpPr>
+          <p:nvPr>
+            <p:ph type="title"/>
+          </p:nvPr>
+        </p:nvSpPr>
+        <p:spPr/>
+        <p:txBody>
+          <a:bodyPr/>
+          <a:lstStyle/>
+          <a:p>
+            <a:r>
+              <a:rPr lang="en-US" dirty="0" smtClean="0"/>
+              <a:t>Exercise18.2</a:t>
+            </a:r>
+            <a:endParaRPr lang="en-US" dirty="0"/>
+          </a:p>
+        </p:txBody>
+      </p:sp>
+      <p:sp>
+        <p:nvSpPr>
+          <p:cNvPr id="3" name="Content Placeholder 2"/>
+          <p:cNvSpPr>
+            <a:spLocks noGrp="1"/>
+          </p:cNvSpPr>
+          <p:nvPr>
+            <p:ph idx="1"/>
+          </p:nvPr>
+        </p:nvSpPr>
+        <p:spPr/>
+        <p:txBody>
+          <a:bodyPr/>
+          <a:lstStyle/>
+          <a:p>
+            <a:r>
+              <a:rPr lang="en-US" dirty="0" smtClean="0"/>
+              <a:t>Load exercise18.2.cpp into solution</a:t>
+            </a:r>
+          </a:p>
+          <a:p>
+            <a:r>
+              <a:rPr lang="en-US" dirty="0" smtClean="0"/>
+              <a:t>Visually examine the source code, predict the output without running the program. </a:t>
+            </a:r>
+            <a:r>
+              <a:rPr lang="en-US" dirty="0" smtClean="0"/>
+              <a:t>D</a:t>
+            </a:r>
+            <a:r>
+              <a:rPr lang="en-US" dirty="0" smtClean="0"/>
+              <a:t>escribe the logic in English. Raise your hand if you don’t know the answer</a:t>
+            </a:r>
+          </a:p>
+          <a:p>
+            <a:r>
+              <a:rPr lang="en-US" dirty="0" smtClean="0"/>
+              <a:t>Execute the program and verify the answer</a:t>
+            </a:r>
+            <a:endParaRPr lang="en-US" dirty="0"/>
+          </a:p>
+        </p:txBody>
+      </p:sp>
+    </p:spTree>
+  </p:cSld>
+  <p:clrMapOvr>
+    <a:masterClrMapping/>
+  </p:clrMapOvr>
+</p:sld>
+</file>
+
+<file path=ppt/slides/slide47.xml><?xml version="1.0" encoding="utf-8"?>
+<p:sld xmlns:a="http://schemas.openxmlformats.org/drawingml/2006/main" xmlns:r="http://schemas.openxmlformats.org/officeDocument/2006/relationships" xmlns:p="http://schemas.openxmlformats.org/presentationml/2006/main">
+  <p:cSld>
+    <p:spTree>
+      <p:nvGrpSpPr>
+        <p:cNvPr id="1" name=""/>
+        <p:cNvGrpSpPr/>
+        <p:nvPr/>
+      </p:nvGrpSpPr>
+      <p:grpSpPr>
+        <a:xfrm>
+          <a:off x="0" y="0"/>
+          <a:ext cx="0" cy="0"/>
+          <a:chOff x="0" y="0"/>
+          <a:chExt cx="0" cy="0"/>
+        </a:xfrm>
+      </p:grpSpPr>
+      <p:sp>
+        <p:nvSpPr>
+          <p:cNvPr id="2" name="Title 1"/>
+          <p:cNvSpPr>
+            <a:spLocks noGrp="1"/>
+          </p:cNvSpPr>
+          <p:nvPr>
+            <p:ph type="title"/>
+          </p:nvPr>
+        </p:nvSpPr>
+        <p:spPr/>
+        <p:txBody>
+          <a:bodyPr/>
+          <a:lstStyle/>
+          <a:p>
+            <a:r>
+              <a:rPr lang="en-US" dirty="0" smtClean="0"/>
+              <a:t>Exercise 18.3</a:t>
+            </a:r>
+            <a:endParaRPr lang="en-US" dirty="0"/>
+          </a:p>
+        </p:txBody>
+      </p:sp>
+      <p:sp>
+        <p:nvSpPr>
+          <p:cNvPr id="4" name="Content Placeholder 2"/>
+          <p:cNvSpPr>
+            <a:spLocks noGrp="1"/>
+          </p:cNvSpPr>
+          <p:nvPr>
+            <p:ph idx="1"/>
+          </p:nvPr>
+        </p:nvSpPr>
+        <p:spPr/>
+        <p:txBody>
+          <a:bodyPr/>
+          <a:lstStyle/>
+          <a:p>
+            <a:r>
+              <a:rPr lang="en-US" dirty="0" smtClean="0"/>
+              <a:t>Load exercise18.3.cpp into solution</a:t>
+            </a:r>
+          </a:p>
+          <a:p>
+            <a:r>
+              <a:rPr lang="en-US" dirty="0" smtClean="0"/>
+              <a:t>Visually examine the source code, answer question 1-5 without running the program. </a:t>
+            </a:r>
+            <a:r>
+              <a:rPr lang="en-US" dirty="0" smtClean="0"/>
+              <a:t>D</a:t>
+            </a:r>
+            <a:r>
+              <a:rPr lang="en-US" dirty="0" smtClean="0"/>
+              <a:t>escribe the logic in English</a:t>
+            </a:r>
+          </a:p>
+          <a:p>
+            <a:r>
+              <a:rPr lang="en-US" dirty="0" smtClean="0"/>
+              <a:t>Execute the program and verify the answer</a:t>
+            </a:r>
+            <a:endParaRPr lang="en-US" dirty="0"/>
+          </a:p>
+        </p:txBody>
+      </p:sp>
+    </p:spTree>
+  </p:cSld>
+  <p:clrMapOvr>
+    <a:masterClrMapping/>
+  </p:clrMapOvr>
+</p:sld>
+</file>
+
+<file path=ppt/slides/slide48.xml><?xml version="1.0" encoding="utf-8"?>
+<p:sld xmlns:a="http://schemas.openxmlformats.org/drawingml/2006/main" xmlns:r="http://schemas.openxmlformats.org/officeDocument/2006/relationships" xmlns:p="http://schemas.openxmlformats.org/presentationml/2006/main">
+  <p:cSld>
+    <p:spTree>
+      <p:nvGrpSpPr>
+        <p:cNvPr id="1" name=""/>
+        <p:cNvGrpSpPr/>
+        <p:nvPr/>
+      </p:nvGrpSpPr>
+      <p:grpSpPr>
+        <a:xfrm>
+          <a:off x="0" y="0"/>
+          <a:ext cx="0" cy="0"/>
+          <a:chOff x="0" y="0"/>
+          <a:chExt cx="0" cy="0"/>
+        </a:xfrm>
+      </p:grpSpPr>
+      <p:sp>
+        <p:nvSpPr>
+          <p:cNvPr id="2" name="Title 1"/>
+          <p:cNvSpPr>
+            <a:spLocks noGrp="1"/>
+          </p:cNvSpPr>
+          <p:nvPr>
+            <p:ph type="title"/>
+          </p:nvPr>
+        </p:nvSpPr>
+        <p:spPr/>
+        <p:txBody>
+          <a:bodyPr/>
+          <a:lstStyle/>
+          <a:p>
+            <a:r>
+              <a:rPr lang="en-US" dirty="0" smtClean="0"/>
+              <a:t>Pointer and Array</a:t>
+            </a:r>
+            <a:endParaRPr lang="en-US" dirty="0"/>
+          </a:p>
+        </p:txBody>
+      </p:sp>
+      <p:sp>
+        <p:nvSpPr>
+          <p:cNvPr id="3" name="Content Placeholder 2"/>
+          <p:cNvSpPr>
+            <a:spLocks noGrp="1"/>
+          </p:cNvSpPr>
+          <p:nvPr>
+            <p:ph idx="1"/>
+          </p:nvPr>
+        </p:nvSpPr>
+        <p:spPr/>
+        <p:txBody>
+          <a:bodyPr/>
+          <a:lstStyle/>
+          <a:p>
+            <a:r>
+              <a:rPr lang="en-US" dirty="0" smtClean="0"/>
+              <a:t>Recap: array is a continuous list of elements, addressable by using an index, e.g. numbers[</a:t>
+            </a:r>
+            <a:r>
+              <a:rPr lang="en-US" dirty="0" err="1" smtClean="0"/>
+              <a:t>i</a:t>
+            </a:r>
+            <a:r>
+              <a:rPr lang="en-US" dirty="0" smtClean="0"/>
+              <a:t>]</a:t>
+            </a:r>
+          </a:p>
+          <a:p>
+            <a:r>
+              <a:rPr lang="en-US" dirty="0" smtClean="0"/>
+              <a:t>The name/label of an array is actually a pointer pointing to the first element of that array. E.g., </a:t>
+            </a:r>
+            <a:r>
+              <a:rPr lang="en-US" dirty="0" err="1" smtClean="0"/>
+              <a:t>int</a:t>
+            </a:r>
+            <a:r>
+              <a:rPr lang="en-US" dirty="0" smtClean="0"/>
+              <a:t> numbers[5], the token “numbers” is a pointer to an integer.</a:t>
+            </a:r>
+            <a:endParaRPr lang="en-US" dirty="0"/>
+          </a:p>
+        </p:txBody>
+      </p:sp>
+    </p:spTree>
+  </p:cSld>
+  <p:clrMapOvr>
+    <a:masterClrMapping/>
+  </p:clrMapOvr>
+</p:sld>
+</file>
+
+<file path=ppt/slides/slide49.xml><?xml version="1.0" encoding="utf-8"?>
+<p:sld xmlns:a="http://schemas.openxmlformats.org/drawingml/2006/main" xmlns:r="http://schemas.openxmlformats.org/officeDocument/2006/relationships" xmlns:p="http://schemas.openxmlformats.org/presentationml/2006/main">
+  <p:cSld>
+    <p:spTree>
+      <p:nvGrpSpPr>
+        <p:cNvPr id="1" name=""/>
+        <p:cNvGrpSpPr/>
+        <p:nvPr/>
+      </p:nvGrpSpPr>
+      <p:grpSpPr>
+        <a:xfrm>
+          <a:off x="0" y="0"/>
+          <a:ext cx="0" cy="0"/>
+          <a:chOff x="0" y="0"/>
+          <a:chExt cx="0" cy="0"/>
+        </a:xfrm>
+      </p:grpSpPr>
+      <p:sp>
+        <p:nvSpPr>
+          <p:cNvPr id="2" name="Title 1"/>
+          <p:cNvSpPr>
+            <a:spLocks noGrp="1"/>
+          </p:cNvSpPr>
+          <p:nvPr>
+            <p:ph type="title"/>
+          </p:nvPr>
+        </p:nvSpPr>
+        <p:spPr/>
+        <p:txBody>
+          <a:bodyPr/>
+          <a:lstStyle/>
+          <a:p>
+            <a:r>
+              <a:rPr lang="en-US" dirty="0" smtClean="0"/>
+              <a:t>Pointer </a:t>
+            </a:r>
+            <a:r>
+              <a:rPr lang="en-US" dirty="0" err="1" smtClean="0"/>
+              <a:t>arithemetics</a:t>
+            </a:r>
+            <a:endParaRPr lang="en-US" dirty="0"/>
+          </a:p>
+        </p:txBody>
+      </p:sp>
+      <p:sp>
+        <p:nvSpPr>
+          <p:cNvPr id="3" name="Content Placeholder 2"/>
+          <p:cNvSpPr>
+            <a:spLocks noGrp="1"/>
+          </p:cNvSpPr>
+          <p:nvPr>
+            <p:ph idx="1"/>
+          </p:nvPr>
+        </p:nvSpPr>
+        <p:spPr>
+          <a:xfrm>
+            <a:off x="457200" y="1600200"/>
+            <a:ext cx="4800600" cy="4525963"/>
+          </a:xfrm>
+        </p:spPr>
+        <p:txBody>
+          <a:bodyPr>
+            <a:normAutofit fontScale="92500"/>
+          </a:bodyPr>
+          <a:lstStyle/>
+          <a:p>
+            <a:r>
+              <a:rPr lang="en-US" dirty="0" smtClean="0"/>
+              <a:t>Pointer data type can be added, subtracted. They can not be divided, or multiplied.</a:t>
+            </a:r>
+          </a:p>
+          <a:p>
+            <a:r>
+              <a:rPr lang="en-US" dirty="0" smtClean="0"/>
+              <a:t>Pointer addition is defined by moving the pointer to points to the next element in memory based on the size of the variable.</a:t>
+            </a:r>
+            <a:endParaRPr lang="en-US" dirty="0"/>
+          </a:p>
+        </p:txBody>
+      </p:sp>
+      <p:pic>
+        <p:nvPicPr>
+          <p:cNvPr id="59394" name="Picture 2" descr="http://www.cplusplus.com/doc/tutorial/pointers/pointer_arithmetics.gif"/>
+          <p:cNvPicPr>
+            <a:picLocks noChangeAspect="1" noChangeArrowheads="1"/>
+          </p:cNvPicPr>
+          <p:nvPr/>
+        </p:nvPicPr>
+        <p:blipFill>
+          <a:blip r:embed="rId2" cstate="print"/>
+          <a:srcRect/>
+          <a:stretch>
+            <a:fillRect/>
+          </a:stretch>
+        </p:blipFill>
+        <p:spPr bwMode="auto">
+          <a:xfrm>
+            <a:off x="5334000" y="3657600"/>
+            <a:ext cx="3533775" cy="2209801"/>
+          </a:xfrm>
+          <a:prstGeom prst="rect">
+            <a:avLst/>
+          </a:prstGeom>
+          <a:noFill/>
+        </p:spPr>
+      </p:pic>
+      <p:sp>
+        <p:nvSpPr>
+          <p:cNvPr id="5" name="TextBox 4"/>
+          <p:cNvSpPr txBox="1"/>
+          <p:nvPr/>
+        </p:nvSpPr>
+        <p:spPr>
+          <a:xfrm>
+            <a:off x="5638800" y="6172200"/>
+            <a:ext cx="2197909" cy="369332"/>
+          </a:xfrm>
+          <a:prstGeom prst="rect">
+            <a:avLst/>
+          </a:prstGeom>
+          <a:noFill/>
+        </p:spPr>
+        <p:txBody>
+          <a:bodyPr wrap="none" rtlCol="0">
+            <a:spAutoFit/>
+          </a:bodyPr>
+          <a:lstStyle/>
+          <a:p>
+            <a:r>
+              <a:rPr lang="en-US" dirty="0" smtClean="0"/>
+              <a:t>Credit: cplusplus.com</a:t>
+            </a:r>
+            <a:endParaRPr lang="en-US" dirty="0"/>
+          </a:p>
+        </p:txBody>
+      </p:sp>
+      <p:sp>
+        <p:nvSpPr>
+          <p:cNvPr id="6" name="TextBox 5"/>
+          <p:cNvSpPr txBox="1"/>
+          <p:nvPr/>
+        </p:nvSpPr>
+        <p:spPr>
+          <a:xfrm>
+            <a:off x="5715000" y="2057400"/>
+            <a:ext cx="1678665" cy="923330"/>
+          </a:xfrm>
+          <a:prstGeom prst="rect">
+            <a:avLst/>
+          </a:prstGeom>
+          <a:noFill/>
+        </p:spPr>
+        <p:txBody>
+          <a:bodyPr wrap="none" rtlCol="0">
+            <a:spAutoFit/>
+          </a:bodyPr>
+          <a:lstStyle/>
+          <a:p>
+            <a:r>
+              <a:rPr lang="en-US" dirty="0" smtClean="0"/>
+              <a:t>c</a:t>
+            </a:r>
+            <a:r>
+              <a:rPr lang="en-US" dirty="0" smtClean="0"/>
+              <a:t>har *</a:t>
+            </a:r>
+            <a:r>
+              <a:rPr lang="en-US" dirty="0" err="1" smtClean="0"/>
+              <a:t>mychar</a:t>
+            </a:r>
+            <a:r>
+              <a:rPr lang="en-US" dirty="0" smtClean="0"/>
+              <a:t>;</a:t>
+            </a:r>
+          </a:p>
+          <a:p>
+            <a:r>
+              <a:rPr lang="en-US" dirty="0" smtClean="0"/>
+              <a:t>s</a:t>
+            </a:r>
+            <a:r>
+              <a:rPr lang="en-US" dirty="0" smtClean="0"/>
+              <a:t>hort *</a:t>
+            </a:r>
+            <a:r>
+              <a:rPr lang="en-US" dirty="0" err="1" smtClean="0"/>
+              <a:t>myshort</a:t>
+            </a:r>
+            <a:r>
+              <a:rPr lang="en-US" dirty="0" smtClean="0"/>
+              <a:t>;</a:t>
+            </a:r>
+          </a:p>
+          <a:p>
+            <a:r>
+              <a:rPr lang="en-US" dirty="0" smtClean="0"/>
+              <a:t>l</a:t>
+            </a:r>
+            <a:r>
+              <a:rPr lang="en-US" dirty="0" smtClean="0"/>
+              <a:t>ong *</a:t>
+            </a:r>
+            <a:r>
+              <a:rPr lang="en-US" dirty="0" err="1" smtClean="0"/>
+              <a:t>mylong</a:t>
+            </a:r>
+            <a:r>
+              <a:rPr lang="en-US" dirty="0" smtClean="0"/>
+              <a:t>;</a:t>
+            </a:r>
+            <a:endParaRPr lang="en-US" dirty="0"/>
+          </a:p>
+        </p:txBody>
+      </p:sp>
+    </p:spTree>
+  </p:cSld>
+  <p:clrMapOvr>
+    <a:masterClrMapping/>
+  </p:clrMapOvr>
+</p:sld>
+</file>
+
 <file path=ppt/slides/slide5.xml><?xml version="1.0" encoding="utf-8"?>
 <p:sld xmlns:a="http://schemas.openxmlformats.org/drawingml/2006/main" xmlns:r="http://schemas.openxmlformats.org/officeDocument/2006/relationships" xmlns:p="http://schemas.openxmlformats.org/presentationml/2006/main">
   <p:cSld>
@@ -10343,6 +11662,340 @@
       </p:par>
     </p:tnLst>
   </p:timing>
+</p:sld>
+</file>
+
+<file path=ppt/slides/slide50.xml><?xml version="1.0" encoding="utf-8"?>
+<p:sld xmlns:a="http://schemas.openxmlformats.org/drawingml/2006/main" xmlns:r="http://schemas.openxmlformats.org/officeDocument/2006/relationships" xmlns:p="http://schemas.openxmlformats.org/presentationml/2006/main">
+  <p:cSld>
+    <p:spTree>
+      <p:nvGrpSpPr>
+        <p:cNvPr id="1" name=""/>
+        <p:cNvGrpSpPr/>
+        <p:nvPr/>
+      </p:nvGrpSpPr>
+      <p:grpSpPr>
+        <a:xfrm>
+          <a:off x="0" y="0"/>
+          <a:ext cx="0" cy="0"/>
+          <a:chOff x="0" y="0"/>
+          <a:chExt cx="0" cy="0"/>
+        </a:xfrm>
+      </p:grpSpPr>
+      <p:sp>
+        <p:nvSpPr>
+          <p:cNvPr id="2" name="Title 1"/>
+          <p:cNvSpPr>
+            <a:spLocks noGrp="1"/>
+          </p:cNvSpPr>
+          <p:nvPr>
+            <p:ph type="title"/>
+          </p:nvPr>
+        </p:nvSpPr>
+        <p:spPr/>
+        <p:txBody>
+          <a:bodyPr/>
+          <a:lstStyle/>
+          <a:p>
+            <a:r>
+              <a:rPr lang="en-US" dirty="0" smtClean="0"/>
+              <a:t>Exercise 19</a:t>
+            </a:r>
+            <a:endParaRPr lang="en-US" dirty="0"/>
+          </a:p>
+        </p:txBody>
+      </p:sp>
+      <p:sp>
+        <p:nvSpPr>
+          <p:cNvPr id="3" name="Content Placeholder 2"/>
+          <p:cNvSpPr>
+            <a:spLocks noGrp="1"/>
+          </p:cNvSpPr>
+          <p:nvPr>
+            <p:ph idx="1"/>
+          </p:nvPr>
+        </p:nvSpPr>
+        <p:spPr/>
+        <p:txBody>
+          <a:bodyPr/>
+          <a:lstStyle/>
+          <a:p>
+            <a:r>
+              <a:rPr lang="en-US" dirty="0" smtClean="0"/>
+              <a:t>Load exercise19.cpp into solution.</a:t>
+            </a:r>
+          </a:p>
+          <a:p>
+            <a:r>
+              <a:rPr lang="en-US" dirty="0" smtClean="0"/>
+              <a:t>Execute the program and follow the source</a:t>
+            </a:r>
+            <a:endParaRPr lang="en-US" dirty="0"/>
+          </a:p>
+        </p:txBody>
+      </p:sp>
+    </p:spTree>
+  </p:cSld>
+  <p:clrMapOvr>
+    <a:masterClrMapping/>
+  </p:clrMapOvr>
+</p:sld>
+</file>
+
+<file path=ppt/slides/slide51.xml><?xml version="1.0" encoding="utf-8"?>
+<p:sld xmlns:a="http://schemas.openxmlformats.org/drawingml/2006/main" xmlns:r="http://schemas.openxmlformats.org/officeDocument/2006/relationships" xmlns:p="http://schemas.openxmlformats.org/presentationml/2006/main">
+  <p:cSld>
+    <p:spTree>
+      <p:nvGrpSpPr>
+        <p:cNvPr id="1" name=""/>
+        <p:cNvGrpSpPr/>
+        <p:nvPr/>
+      </p:nvGrpSpPr>
+      <p:grpSpPr>
+        <a:xfrm>
+          <a:off x="0" y="0"/>
+          <a:ext cx="0" cy="0"/>
+          <a:chOff x="0" y="0"/>
+          <a:chExt cx="0" cy="0"/>
+        </a:xfrm>
+      </p:grpSpPr>
+      <p:sp>
+        <p:nvSpPr>
+          <p:cNvPr id="2" name="Title 1"/>
+          <p:cNvSpPr>
+            <a:spLocks noGrp="1"/>
+          </p:cNvSpPr>
+          <p:nvPr>
+            <p:ph type="title"/>
+          </p:nvPr>
+        </p:nvSpPr>
+        <p:spPr/>
+        <p:txBody>
+          <a:bodyPr/>
+          <a:lstStyle/>
+          <a:p>
+            <a:r>
+              <a:rPr lang="en-US" dirty="0" smtClean="0"/>
+              <a:t>Exercise19.2</a:t>
+            </a:r>
+            <a:endParaRPr lang="en-US" dirty="0"/>
+          </a:p>
+        </p:txBody>
+      </p:sp>
+      <p:sp>
+        <p:nvSpPr>
+          <p:cNvPr id="3" name="Content Placeholder 2"/>
+          <p:cNvSpPr>
+            <a:spLocks noGrp="1"/>
+          </p:cNvSpPr>
+          <p:nvPr>
+            <p:ph idx="1"/>
+          </p:nvPr>
+        </p:nvSpPr>
+        <p:spPr/>
+        <p:txBody>
+          <a:bodyPr/>
+          <a:lstStyle/>
+          <a:p>
+            <a:r>
+              <a:rPr lang="en-US" dirty="0" smtClean="0"/>
+              <a:t>Load exercise19.2.cpp into solution</a:t>
+            </a:r>
+          </a:p>
+          <a:p>
+            <a:r>
+              <a:rPr lang="en-US" dirty="0" smtClean="0"/>
+              <a:t>Rewrite the program: instead of using pointer, use array and index to assign the value to all elements in numbers array.</a:t>
+            </a:r>
+            <a:endParaRPr lang="en-US" dirty="0"/>
+          </a:p>
+        </p:txBody>
+      </p:sp>
+    </p:spTree>
+  </p:cSld>
+  <p:clrMapOvr>
+    <a:masterClrMapping/>
+  </p:clrMapOvr>
+</p:sld>
+</file>
+
+<file path=ppt/slides/slide52.xml><?xml version="1.0" encoding="utf-8"?>
+<p:sld xmlns:a="http://schemas.openxmlformats.org/drawingml/2006/main" xmlns:r="http://schemas.openxmlformats.org/officeDocument/2006/relationships" xmlns:p="http://schemas.openxmlformats.org/presentationml/2006/main">
+  <p:cSld>
+    <p:spTree>
+      <p:nvGrpSpPr>
+        <p:cNvPr id="1" name=""/>
+        <p:cNvGrpSpPr/>
+        <p:nvPr/>
+      </p:nvGrpSpPr>
+      <p:grpSpPr>
+        <a:xfrm>
+          <a:off x="0" y="0"/>
+          <a:ext cx="0" cy="0"/>
+          <a:chOff x="0" y="0"/>
+          <a:chExt cx="0" cy="0"/>
+        </a:xfrm>
+      </p:grpSpPr>
+      <p:sp>
+        <p:nvSpPr>
+          <p:cNvPr id="2" name="Title 1"/>
+          <p:cNvSpPr>
+            <a:spLocks noGrp="1"/>
+          </p:cNvSpPr>
+          <p:nvPr>
+            <p:ph type="title"/>
+          </p:nvPr>
+        </p:nvSpPr>
+        <p:spPr/>
+        <p:txBody>
+          <a:bodyPr/>
+          <a:lstStyle/>
+          <a:p>
+            <a:r>
+              <a:rPr lang="en-US" dirty="0" smtClean="0"/>
+              <a:t>Pointer to pointer</a:t>
+            </a:r>
+            <a:endParaRPr lang="en-US" dirty="0"/>
+          </a:p>
+        </p:txBody>
+      </p:sp>
+      <p:sp>
+        <p:nvSpPr>
+          <p:cNvPr id="3" name="Content Placeholder 2"/>
+          <p:cNvSpPr>
+            <a:spLocks noGrp="1"/>
+          </p:cNvSpPr>
+          <p:nvPr>
+            <p:ph idx="1"/>
+          </p:nvPr>
+        </p:nvSpPr>
+        <p:spPr>
+          <a:xfrm>
+            <a:off x="457200" y="1600200"/>
+            <a:ext cx="3581400" cy="4525963"/>
+          </a:xfrm>
+        </p:spPr>
+        <p:txBody>
+          <a:bodyPr/>
+          <a:lstStyle/>
+          <a:p>
+            <a:pPr>
+              <a:buNone/>
+            </a:pPr>
+            <a:r>
+              <a:rPr lang="en-US" dirty="0" err="1" smtClean="0"/>
+              <a:t>Int</a:t>
+            </a:r>
+            <a:r>
+              <a:rPr lang="en-US" dirty="0" smtClean="0"/>
+              <a:t> a = 10;</a:t>
+            </a:r>
+          </a:p>
+          <a:p>
+            <a:pPr>
+              <a:buNone/>
+            </a:pPr>
+            <a:r>
+              <a:rPr lang="en-US" dirty="0" err="1" smtClean="0"/>
+              <a:t>Int</a:t>
+            </a:r>
+            <a:r>
+              <a:rPr lang="en-US" dirty="0" smtClean="0"/>
+              <a:t> **b;</a:t>
+            </a:r>
+          </a:p>
+          <a:p>
+            <a:pPr>
+              <a:buNone/>
+            </a:pPr>
+            <a:endParaRPr lang="en-US" dirty="0"/>
+          </a:p>
+        </p:txBody>
+      </p:sp>
+    </p:spTree>
+  </p:cSld>
+  <p:clrMapOvr>
+    <a:masterClrMapping/>
+  </p:clrMapOvr>
+</p:sld>
+</file>
+
+<file path=ppt/slides/slide53.xml><?xml version="1.0" encoding="utf-8"?>
+<p:sld xmlns:a="http://schemas.openxmlformats.org/drawingml/2006/main" xmlns:r="http://schemas.openxmlformats.org/officeDocument/2006/relationships" xmlns:p="http://schemas.openxmlformats.org/presentationml/2006/main">
+  <p:cSld>
+    <p:spTree>
+      <p:nvGrpSpPr>
+        <p:cNvPr id="1" name=""/>
+        <p:cNvGrpSpPr/>
+        <p:nvPr/>
+      </p:nvGrpSpPr>
+      <p:grpSpPr>
+        <a:xfrm>
+          <a:off x="0" y="0"/>
+          <a:ext cx="0" cy="0"/>
+          <a:chOff x="0" y="0"/>
+          <a:chExt cx="0" cy="0"/>
+        </a:xfrm>
+      </p:grpSpPr>
+      <p:sp>
+        <p:nvSpPr>
+          <p:cNvPr id="2" name="Title 1"/>
+          <p:cNvSpPr>
+            <a:spLocks noGrp="1"/>
+          </p:cNvSpPr>
+          <p:nvPr>
+            <p:ph type="title"/>
+          </p:nvPr>
+        </p:nvSpPr>
+        <p:spPr/>
+        <p:txBody>
+          <a:bodyPr/>
+          <a:lstStyle/>
+          <a:p>
+            <a:r>
+              <a:rPr lang="en-US" dirty="0" smtClean="0"/>
+              <a:t>Exercise 17: Function Calls</a:t>
+            </a:r>
+            <a:endParaRPr lang="en-US" dirty="0"/>
+          </a:p>
+        </p:txBody>
+      </p:sp>
+      <p:sp>
+        <p:nvSpPr>
+          <p:cNvPr id="3" name="Content Placeholder 2"/>
+          <p:cNvSpPr>
+            <a:spLocks noGrp="1"/>
+          </p:cNvSpPr>
+          <p:nvPr>
+            <p:ph idx="1"/>
+          </p:nvPr>
+        </p:nvSpPr>
+        <p:spPr/>
+        <p:txBody>
+          <a:bodyPr/>
+          <a:lstStyle/>
+          <a:p>
+            <a:r>
+              <a:rPr lang="en-US" dirty="0" smtClean="0"/>
+              <a:t>Rewrite homework assignment 2 using a function call: </a:t>
+            </a:r>
+            <a:r>
+              <a:rPr lang="en-US" dirty="0" err="1" smtClean="0"/>
+              <a:t>ReadLine</a:t>
+            </a:r>
+            <a:r>
+              <a:rPr lang="en-US" dirty="0" smtClean="0"/>
+              <a:t>()</a:t>
+            </a:r>
+            <a:endParaRPr lang="en-US" dirty="0"/>
+          </a:p>
+        </p:txBody>
+      </p:sp>
+    </p:spTree>
+  </p:cSld>
+  <p:clrMapOvr>
+    <a:masterClrMapping/>
+  </p:clrMapOvr>
 </p:sld>
 </file>
 
@@ -10667,8 +12320,24 @@
           </a:xfrm>
         </p:spPr>
         <p:txBody>
-          <a:bodyPr/>
-          <a:lstStyle/>
+          <a:bodyPr>
+            <a:normAutofit lnSpcReduction="10000"/>
+          </a:bodyPr>
+          <a:lstStyle/>
+          <a:p>
+            <a:r>
+              <a:rPr lang="en-US" dirty="0" smtClean="0"/>
+              <a:t>Declaration: </a:t>
+            </a:r>
+            <a:r>
+              <a:rPr lang="en-US" dirty="0" err="1" smtClean="0"/>
+              <a:t>int</a:t>
+            </a:r>
+            <a:r>
+              <a:rPr lang="en-US" dirty="0" smtClean="0"/>
+              <a:t> a;</a:t>
+            </a:r>
+          </a:p>
           <a:p>
             <a:r>
               <a:rPr lang="en-US" dirty="0" smtClean="0"/>
@@ -10745,7 +12414,7 @@
           <a:p>
             <a:r>
               <a:rPr lang="en-US" dirty="0" smtClean="0"/>
-              <a:t>If (two == 1)</a:t>
+              <a:t>if (two == 1)</a:t>
             </a:r>
           </a:p>
           <a:p>
@@ -10939,18 +12608,26 @@
         </p:spPr>
         <p:txBody>
           <a:bodyPr>
-            <a:normAutofit lnSpcReduction="10000"/>
+            <a:normAutofit/>
           </a:bodyPr>
           <a:lstStyle/>
           <a:p>
             <a:r>
-              <a:rPr lang="en-US" dirty="0" smtClean="0"/>
+              <a:rPr lang="en-US" dirty="0" smtClean="0">
+                <a:solidFill>
+                  <a:srgbClr val="FF0000"/>
+                </a:solidFill>
+              </a:rPr>
               <a:t>Byte and bit</a:t>
             </a:r>
           </a:p>
           <a:p>
             <a:r>
-              <a:rPr lang="en-US" dirty="0" smtClean="0"/>
+              <a:rPr lang="en-US" dirty="0" smtClean="0">
+                <a:solidFill>
+                  <a:srgbClr val="FF0000"/>
+                </a:solidFill>
+              </a:rPr>
               <a:t>Binary number, Decimal number</a:t>
             </a:r>
           </a:p>
@@ -10961,7 +12638,13 @@
             </a:r>
             <a:r>
               <a:rPr lang="en-US" dirty="0" smtClean="0"/>
-              <a:t> (two bytes… is it really?) and long (4 bytes) on older OS</a:t>
+              <a:t> and long (4 bytes) </a:t>
+            </a:r>
+          </a:p>
+          <a:p>
+            <a:r>
+              <a:rPr lang="en-US" dirty="0" smtClean="0"/>
+              <a:t>Signed and unsigned</a:t>
             </a:r>
           </a:p>
           <a:p>
@@ -11195,7 +12878,7 @@
                     <a:lstStyle/>
                     <a:p>
                       <a:r>
-                        <a:rPr lang="en-US" sz="1400"/>
+                        <a:rPr lang="en-US" sz="1400" dirty="0"/>
                         <a:t>Name</a:t>
                       </a:r>
                     </a:p>
@@ -11851,9 +13534,10 @@
                     <a:lstStyle/>
                     <a:p>
                       <a:r>
-                        <a:rPr lang="en-US" sz="1400"/>
+                        <a:rPr lang="en-US" sz="1400" dirty="0" err="1"/>
                         <a:t>int</a:t>
                       </a:r>
+                      <a:endParaRPr lang="en-US" sz="1400" dirty="0"/>
                     </a:p>
                   </a:txBody>
                   <a:tcPr marL="32000" marR="32000" marT="16000" marB="16000" anchor="ctr">

</xml_diff>